<commit_message>
added pics to presen
</commit_message>
<xml_diff>
--- a/documents/predPres.pptx
+++ b/documents/predPres.pptx
@@ -5,7 +5,10 @@
     <p:sldMasterId id="2147483648" r:id="rId1"/>
   </p:sldMasterIdLst>
   <p:sldIdLst>
-    <p:sldId id="256" r:id="rId2"/>
+    <p:sldId id="257" r:id="rId2"/>
+    <p:sldId id="256" r:id="rId3"/>
+    <p:sldId id="258" r:id="rId4"/>
+    <p:sldId id="259" r:id="rId5"/>
   </p:sldIdLst>
   <p:sldSz cx="9144000" cy="6858000" type="screen4x3"/>
   <p:notesSz cx="6858000" cy="9144000"/>
@@ -104,6 +107,22 @@
       </a:defRPr>
     </a:lvl9pPr>
   </p:defaultTextStyle>
+  <p:extLst>
+    <p:ext uri="{EFAFB233-063F-42B5-8137-9DF3F51BA10A}">
+      <p15:sldGuideLst xmlns:p15="http://schemas.microsoft.com/office/powerpoint/2012/main">
+        <p15:guide id="1" orient="horz" pos="2160">
+          <p15:clr>
+            <a:srgbClr val="A4A3A4"/>
+          </p15:clr>
+        </p15:guide>
+        <p15:guide id="2" pos="2880">
+          <p15:clr>
+            <a:srgbClr val="A4A3A4"/>
+          </p15:clr>
+        </p15:guide>
+      </p15:sldGuideLst>
+    </p:ext>
+  </p:extLst>
 </p:presentation>
 </file>
 
@@ -288,7 +307,7 @@
           <a:p>
             <a:fld id="{B58FBE55-019B-7F44-916F-F5D370B1C098}" type="datetimeFigureOut">
               <a:rPr lang="en-US" smtClean="0"/>
-              <a:t>26/04/16</a:t>
+              <a:t>4/26/2016</a:t>
             </a:fld>
             <a:endParaRPr lang="en-US"/>
           </a:p>
@@ -458,7 +477,7 @@
           <a:p>
             <a:fld id="{B58FBE55-019B-7F44-916F-F5D370B1C098}" type="datetimeFigureOut">
               <a:rPr lang="en-US" smtClean="0"/>
-              <a:t>26/04/16</a:t>
+              <a:t>4/26/2016</a:t>
             </a:fld>
             <a:endParaRPr lang="en-US"/>
           </a:p>
@@ -638,7 +657,7 @@
           <a:p>
             <a:fld id="{B58FBE55-019B-7F44-916F-F5D370B1C098}" type="datetimeFigureOut">
               <a:rPr lang="en-US" smtClean="0"/>
-              <a:t>26/04/16</a:t>
+              <a:t>4/26/2016</a:t>
             </a:fld>
             <a:endParaRPr lang="en-US"/>
           </a:p>
@@ -808,7 +827,7 @@
           <a:p>
             <a:fld id="{B58FBE55-019B-7F44-916F-F5D370B1C098}" type="datetimeFigureOut">
               <a:rPr lang="en-US" smtClean="0"/>
-              <a:t>26/04/16</a:t>
+              <a:t>4/26/2016</a:t>
             </a:fld>
             <a:endParaRPr lang="en-US"/>
           </a:p>
@@ -1054,7 +1073,7 @@
           <a:p>
             <a:fld id="{B58FBE55-019B-7F44-916F-F5D370B1C098}" type="datetimeFigureOut">
               <a:rPr lang="en-US" smtClean="0"/>
-              <a:t>26/04/16</a:t>
+              <a:t>4/26/2016</a:t>
             </a:fld>
             <a:endParaRPr lang="en-US"/>
           </a:p>
@@ -1342,7 +1361,7 @@
           <a:p>
             <a:fld id="{B58FBE55-019B-7F44-916F-F5D370B1C098}" type="datetimeFigureOut">
               <a:rPr lang="en-US" smtClean="0"/>
-              <a:t>26/04/16</a:t>
+              <a:t>4/26/2016</a:t>
             </a:fld>
             <a:endParaRPr lang="en-US"/>
           </a:p>
@@ -1764,7 +1783,7 @@
           <a:p>
             <a:fld id="{B58FBE55-019B-7F44-916F-F5D370B1C098}" type="datetimeFigureOut">
               <a:rPr lang="en-US" smtClean="0"/>
-              <a:t>26/04/16</a:t>
+              <a:t>4/26/2016</a:t>
             </a:fld>
             <a:endParaRPr lang="en-US"/>
           </a:p>
@@ -1882,7 +1901,7 @@
           <a:p>
             <a:fld id="{B58FBE55-019B-7F44-916F-F5D370B1C098}" type="datetimeFigureOut">
               <a:rPr lang="en-US" smtClean="0"/>
-              <a:t>26/04/16</a:t>
+              <a:t>4/26/2016</a:t>
             </a:fld>
             <a:endParaRPr lang="en-US"/>
           </a:p>
@@ -1977,7 +1996,7 @@
           <a:p>
             <a:fld id="{B58FBE55-019B-7F44-916F-F5D370B1C098}" type="datetimeFigureOut">
               <a:rPr lang="en-US" smtClean="0"/>
-              <a:t>26/04/16</a:t>
+              <a:t>4/26/2016</a:t>
             </a:fld>
             <a:endParaRPr lang="en-US"/>
           </a:p>
@@ -2254,7 +2273,7 @@
           <a:p>
             <a:fld id="{B58FBE55-019B-7F44-916F-F5D370B1C098}" type="datetimeFigureOut">
               <a:rPr lang="en-US" smtClean="0"/>
-              <a:t>26/04/16</a:t>
+              <a:t>4/26/2016</a:t>
             </a:fld>
             <a:endParaRPr lang="en-US"/>
           </a:p>
@@ -2507,7 +2526,7 @@
           <a:p>
             <a:fld id="{B58FBE55-019B-7F44-916F-F5D370B1C098}" type="datetimeFigureOut">
               <a:rPr lang="en-US" smtClean="0"/>
-              <a:t>26/04/16</a:t>
+              <a:t>4/26/2016</a:t>
             </a:fld>
             <a:endParaRPr lang="en-US"/>
           </a:p>
@@ -2720,7 +2739,7 @@
           <a:p>
             <a:fld id="{B58FBE55-019B-7F44-916F-F5D370B1C098}" type="datetimeFigureOut">
               <a:rPr lang="en-US" smtClean="0"/>
-              <a:t>26/04/16</a:t>
+              <a:t>4/26/2016</a:t>
             </a:fld>
             <a:endParaRPr lang="en-US"/>
           </a:p>
@@ -3095,6 +3114,141 @@
           <a:chExt cx="0" cy="0"/>
         </a:xfrm>
       </p:grpSpPr>
+      <p:sp>
+        <p:nvSpPr>
+          <p:cNvPr id="2" name="Title 1"/>
+          <p:cNvSpPr>
+            <a:spLocks noGrp="1"/>
+          </p:cNvSpPr>
+          <p:nvPr>
+            <p:ph type="title"/>
+          </p:nvPr>
+        </p:nvSpPr>
+        <p:spPr/>
+        <p:txBody>
+          <a:bodyPr>
+            <a:normAutofit fontScale="90000"/>
+          </a:bodyPr>
+          <a:lstStyle/>
+          <a:p>
+            <a:r>
+              <a:rPr lang="sv-SE" b="1" dirty="0"/>
+              <a:t>Adaptive </a:t>
+            </a:r>
+            <a:r>
+              <a:rPr lang="sv-SE" b="1" dirty="0" err="1"/>
+              <a:t>f</a:t>
+            </a:r>
+            <a:r>
+              <a:rPr lang="sv-SE" b="1" dirty="0" err="1" smtClean="0"/>
+              <a:t>riction</a:t>
+            </a:r>
+            <a:r>
+              <a:rPr lang="sv-SE" b="1" dirty="0" smtClean="0"/>
+              <a:t> </a:t>
+            </a:r>
+            <a:r>
+              <a:rPr lang="sv-SE" b="1" dirty="0" err="1"/>
+              <a:t>c</a:t>
+            </a:r>
+            <a:r>
+              <a:rPr lang="sv-SE" b="1" dirty="0" err="1" smtClean="0"/>
+              <a:t>ompensation</a:t>
+            </a:r>
+            <a:r>
+              <a:rPr lang="sv-SE" b="1" dirty="0"/>
+              <a:t/>
+            </a:r>
+            <a:br>
+              <a:rPr lang="sv-SE" b="1" dirty="0"/>
+            </a:br>
+            <a:r>
+              <a:rPr lang="sv-SE" b="1" dirty="0" err="1" smtClean="0"/>
+              <a:t>of</a:t>
+            </a:r>
+            <a:r>
+              <a:rPr lang="sv-SE" b="1" dirty="0" smtClean="0"/>
+              <a:t> </a:t>
+            </a:r>
+            <a:r>
+              <a:rPr lang="sv-SE" b="1" dirty="0" err="1" smtClean="0"/>
+              <a:t>inverted</a:t>
+            </a:r>
+            <a:r>
+              <a:rPr lang="sv-SE" b="1" dirty="0" smtClean="0"/>
+              <a:t> </a:t>
+            </a:r>
+            <a:r>
+              <a:rPr lang="sv-SE" b="1" dirty="0" err="1" smtClean="0"/>
+              <a:t>pedulum</a:t>
+            </a:r>
+            <a:r>
+              <a:rPr lang="sv-SE" b="1" dirty="0" smtClean="0"/>
+              <a:t>.</a:t>
+            </a:r>
+            <a:endParaRPr lang="sv-SE" dirty="0"/>
+          </a:p>
+        </p:txBody>
+      </p:sp>
+      <p:pic>
+        <p:nvPicPr>
+          <p:cNvPr id="4" name="Content Placeholder 3"/>
+          <p:cNvPicPr>
+            <a:picLocks noGrp="1" noChangeAspect="1"/>
+          </p:cNvPicPr>
+          <p:nvPr>
+            <p:ph idx="1"/>
+          </p:nvPr>
+        </p:nvPicPr>
+        <p:blipFill>
+          <a:blip r:embed="rId2">
+            <a:extLst>
+              <a:ext uri="{28A0092B-C50C-407E-A947-70E740481C1C}">
+                <a14:useLocalDpi xmlns:a14="http://schemas.microsoft.com/office/drawing/2010/main" val="0"/>
+              </a:ext>
+            </a:extLst>
+          </a:blip>
+          <a:stretch>
+            <a:fillRect/>
+          </a:stretch>
+        </p:blipFill>
+        <p:spPr>
+          <a:xfrm rot="5400000">
+            <a:off x="2308225" y="2166739"/>
+            <a:ext cx="4525963" cy="3394472"/>
+          </a:xfrm>
+        </p:spPr>
+      </p:pic>
+    </p:spTree>
+    <p:extLst>
+      <p:ext uri="{BB962C8B-B14F-4D97-AF65-F5344CB8AC3E}">
+        <p14:creationId xmlns:p14="http://schemas.microsoft.com/office/powerpoint/2010/main" val="3461445285"/>
+      </p:ext>
+    </p:extLst>
+  </p:cSld>
+  <p:clrMapOvr>
+    <a:masterClrMapping/>
+  </p:clrMapOvr>
+</p:sld>
+</file>
+
+<file path=ppt/slides/slide2.xml><?xml version="1.0" encoding="utf-8"?>
+<p:sld xmlns:a="http://schemas.openxmlformats.org/drawingml/2006/main" xmlns:r="http://schemas.openxmlformats.org/officeDocument/2006/relationships" xmlns:p="http://schemas.openxmlformats.org/presentationml/2006/main">
+  <p:cSld>
+    <p:spTree>
+      <p:nvGrpSpPr>
+        <p:cNvPr id="1" name=""/>
+        <p:cNvGrpSpPr/>
+        <p:nvPr/>
+      </p:nvGrpSpPr>
+      <p:grpSpPr>
+        <a:xfrm>
+          <a:off x="0" y="0"/>
+          <a:ext cx="0" cy="0"/>
+          <a:chOff x="0" y="0"/>
+          <a:chExt cx="0" cy="0"/>
+        </a:xfrm>
+      </p:grpSpPr>
       <p:pic>
         <p:nvPicPr>
           <p:cNvPr id="5" name="Picture 4" descr="Screen Shot 2016-04-26 at 14.44.30.png"/>
@@ -3249,6 +3403,304 @@
     <p:extLst>
       <p:ext uri="{BB962C8B-B14F-4D97-AF65-F5344CB8AC3E}">
         <p14:creationId xmlns:p14="http://schemas.microsoft.com/office/powerpoint/2010/main" val="4122852477"/>
+      </p:ext>
+    </p:extLst>
+  </p:cSld>
+  <p:clrMapOvr>
+    <a:masterClrMapping/>
+  </p:clrMapOvr>
+</p:sld>
+</file>
+
+<file path=ppt/slides/slide3.xml><?xml version="1.0" encoding="utf-8"?>
+<p:sld xmlns:a="http://schemas.openxmlformats.org/drawingml/2006/main" xmlns:r="http://schemas.openxmlformats.org/officeDocument/2006/relationships" xmlns:p="http://schemas.openxmlformats.org/presentationml/2006/main">
+  <p:cSld>
+    <p:spTree>
+      <p:nvGrpSpPr>
+        <p:cNvPr id="1" name=""/>
+        <p:cNvGrpSpPr/>
+        <p:nvPr/>
+      </p:nvGrpSpPr>
+      <p:grpSpPr>
+        <a:xfrm>
+          <a:off x="0" y="0"/>
+          <a:ext cx="0" cy="0"/>
+          <a:chOff x="0" y="0"/>
+          <a:chExt cx="0" cy="0"/>
+        </a:xfrm>
+      </p:grpSpPr>
+      <p:sp>
+        <p:nvSpPr>
+          <p:cNvPr id="2" name="Title 1"/>
+          <p:cNvSpPr>
+            <a:spLocks noGrp="1"/>
+          </p:cNvSpPr>
+          <p:nvPr>
+            <p:ph type="title"/>
+          </p:nvPr>
+        </p:nvSpPr>
+        <p:spPr/>
+        <p:txBody>
+          <a:bodyPr/>
+          <a:lstStyle/>
+          <a:p>
+            <a:r>
+              <a:rPr lang="sv-SE" dirty="0" err="1" smtClean="0"/>
+              <a:t>Friction</a:t>
+            </a:r>
+            <a:r>
+              <a:rPr lang="sv-SE" dirty="0" smtClean="0"/>
+              <a:t> </a:t>
+            </a:r>
+            <a:r>
+              <a:rPr lang="sv-SE" dirty="0" err="1" smtClean="0"/>
+              <a:t>models</a:t>
+            </a:r>
+            <a:endParaRPr lang="sv-SE" dirty="0"/>
+          </a:p>
+        </p:txBody>
+      </p:sp>
+      <p:pic>
+        <p:nvPicPr>
+          <p:cNvPr id="4" name="Content Placeholder 3"/>
+          <p:cNvPicPr>
+            <a:picLocks noGrp="1" noChangeAspect="1"/>
+          </p:cNvPicPr>
+          <p:nvPr>
+            <p:ph idx="1"/>
+          </p:nvPr>
+        </p:nvPicPr>
+        <p:blipFill>
+          <a:blip r:embed="rId2">
+            <a:extLst>
+              <a:ext uri="{28A0092B-C50C-407E-A947-70E740481C1C}">
+                <a14:useLocalDpi xmlns:a14="http://schemas.microsoft.com/office/drawing/2010/main" val="0"/>
+              </a:ext>
+            </a:extLst>
+          </a:blip>
+          <a:stretch>
+            <a:fillRect/>
+          </a:stretch>
+        </p:blipFill>
+        <p:spPr>
+          <a:xfrm>
+            <a:off x="1504522" y="2069693"/>
+            <a:ext cx="6134956" cy="2276793"/>
+          </a:xfrm>
+        </p:spPr>
+      </p:pic>
+      <p:sp>
+        <p:nvSpPr>
+          <p:cNvPr id="5" name="TextBox 4"/>
+          <p:cNvSpPr txBox="1"/>
+          <p:nvPr/>
+        </p:nvSpPr>
+        <p:spPr>
+          <a:xfrm>
+            <a:off x="1504522" y="4346486"/>
+            <a:ext cx="2715905" cy="369332"/>
+          </a:xfrm>
+          <a:prstGeom prst="rect">
+            <a:avLst/>
+          </a:prstGeom>
+          <a:noFill/>
+        </p:spPr>
+        <p:txBody>
+          <a:bodyPr wrap="square" rtlCol="0">
+            <a:spAutoFit/>
+          </a:bodyPr>
+          <a:lstStyle/>
+          <a:p>
+            <a:r>
+              <a:rPr lang="sv-SE" dirty="0"/>
+              <a:t>a) </a:t>
+            </a:r>
+            <a:r>
+              <a:rPr lang="sv-SE" dirty="0" err="1" smtClean="0"/>
+              <a:t>Coulomb</a:t>
+            </a:r>
+            <a:r>
+              <a:rPr lang="sv-SE" dirty="0" smtClean="0"/>
+              <a:t> </a:t>
+            </a:r>
+            <a:r>
+              <a:rPr lang="sv-SE" dirty="0" err="1" smtClean="0"/>
+              <a:t>friction</a:t>
+            </a:r>
+            <a:r>
+              <a:rPr lang="sv-SE" dirty="0" smtClean="0"/>
+              <a:t> </a:t>
+            </a:r>
+            <a:r>
+              <a:rPr lang="sv-SE" dirty="0" err="1"/>
+              <a:t>model</a:t>
+            </a:r>
+            <a:endParaRPr lang="sv-SE" dirty="0"/>
+          </a:p>
+        </p:txBody>
+      </p:sp>
+      <p:sp>
+        <p:nvSpPr>
+          <p:cNvPr id="6" name="TextBox 5"/>
+          <p:cNvSpPr txBox="1"/>
+          <p:nvPr/>
+        </p:nvSpPr>
+        <p:spPr>
+          <a:xfrm>
+            <a:off x="4823202" y="4368906"/>
+            <a:ext cx="2715905" cy="646331"/>
+          </a:xfrm>
+          <a:prstGeom prst="rect">
+            <a:avLst/>
+          </a:prstGeom>
+          <a:noFill/>
+        </p:spPr>
+        <p:txBody>
+          <a:bodyPr wrap="square" rtlCol="0">
+            <a:spAutoFit/>
+          </a:bodyPr>
+          <a:lstStyle/>
+          <a:p>
+            <a:r>
+              <a:rPr lang="sv-SE" dirty="0" smtClean="0"/>
+              <a:t>b) </a:t>
+            </a:r>
+            <a:r>
+              <a:rPr lang="sv-SE" dirty="0" err="1" smtClean="0"/>
+              <a:t>Coulomb</a:t>
+            </a:r>
+            <a:r>
+              <a:rPr lang="sv-SE" dirty="0" smtClean="0"/>
+              <a:t> + </a:t>
+            </a:r>
+            <a:r>
+              <a:rPr lang="sv-SE" dirty="0" err="1" smtClean="0"/>
+              <a:t>viscosity</a:t>
+            </a:r>
+            <a:r>
+              <a:rPr lang="sv-SE" dirty="0" smtClean="0"/>
+              <a:t> </a:t>
+            </a:r>
+            <a:r>
+              <a:rPr lang="sv-SE" dirty="0" err="1" smtClean="0"/>
+              <a:t>friction</a:t>
+            </a:r>
+            <a:r>
+              <a:rPr lang="sv-SE" dirty="0" smtClean="0"/>
+              <a:t> </a:t>
+            </a:r>
+            <a:r>
+              <a:rPr lang="sv-SE" dirty="0" err="1"/>
+              <a:t>model</a:t>
+            </a:r>
+            <a:endParaRPr lang="sv-SE" dirty="0"/>
+          </a:p>
+        </p:txBody>
+      </p:sp>
+    </p:spTree>
+    <p:extLst>
+      <p:ext uri="{BB962C8B-B14F-4D97-AF65-F5344CB8AC3E}">
+        <p14:creationId xmlns:p14="http://schemas.microsoft.com/office/powerpoint/2010/main" val="1192806272"/>
+      </p:ext>
+    </p:extLst>
+  </p:cSld>
+  <p:clrMapOvr>
+    <a:masterClrMapping/>
+  </p:clrMapOvr>
+</p:sld>
+</file>
+
+<file path=ppt/slides/slide4.xml><?xml version="1.0" encoding="utf-8"?>
+<p:sld xmlns:a="http://schemas.openxmlformats.org/drawingml/2006/main" xmlns:r="http://schemas.openxmlformats.org/officeDocument/2006/relationships" xmlns:p="http://schemas.openxmlformats.org/presentationml/2006/main">
+  <p:cSld>
+    <p:spTree>
+      <p:nvGrpSpPr>
+        <p:cNvPr id="1" name=""/>
+        <p:cNvGrpSpPr/>
+        <p:nvPr/>
+      </p:nvGrpSpPr>
+      <p:grpSpPr>
+        <a:xfrm>
+          <a:off x="0" y="0"/>
+          <a:ext cx="0" cy="0"/>
+          <a:chOff x="0" y="0"/>
+          <a:chExt cx="0" cy="0"/>
+        </a:xfrm>
+      </p:grpSpPr>
+      <p:sp>
+        <p:nvSpPr>
+          <p:cNvPr id="2" name="Title 1"/>
+          <p:cNvSpPr>
+            <a:spLocks noGrp="1"/>
+          </p:cNvSpPr>
+          <p:nvPr>
+            <p:ph type="title"/>
+          </p:nvPr>
+        </p:nvSpPr>
+        <p:spPr/>
+        <p:txBody>
+          <a:bodyPr>
+            <a:normAutofit fontScale="90000"/>
+          </a:bodyPr>
+          <a:lstStyle/>
+          <a:p>
+            <a:r>
+              <a:rPr lang="sv-SE" dirty="0" err="1" smtClean="0"/>
+              <a:t>Estimated</a:t>
+            </a:r>
+            <a:r>
+              <a:rPr lang="sv-SE" dirty="0" smtClean="0"/>
+              <a:t> </a:t>
+            </a:r>
+            <a:r>
+              <a:rPr lang="sv-SE" dirty="0" err="1" smtClean="0"/>
+              <a:t>friction</a:t>
+            </a:r>
+            <a:r>
+              <a:rPr lang="sv-SE" dirty="0" smtClean="0"/>
+              <a:t> for different </a:t>
+            </a:r>
+            <a:r>
+              <a:rPr lang="sv-SE" dirty="0" err="1" smtClean="0"/>
+              <a:t>velocities</a:t>
+            </a:r>
+            <a:endParaRPr lang="sv-SE" dirty="0"/>
+          </a:p>
+        </p:txBody>
+      </p:sp>
+      <p:pic>
+        <p:nvPicPr>
+          <p:cNvPr id="6" name="Content Placeholder 5"/>
+          <p:cNvPicPr>
+            <a:picLocks noGrp="1" noChangeAspect="1"/>
+          </p:cNvPicPr>
+          <p:nvPr>
+            <p:ph idx="1"/>
+          </p:nvPr>
+        </p:nvPicPr>
+        <p:blipFill>
+          <a:blip r:embed="rId2">
+            <a:extLst>
+              <a:ext uri="{28A0092B-C50C-407E-A947-70E740481C1C}">
+                <a14:useLocalDpi xmlns:a14="http://schemas.microsoft.com/office/drawing/2010/main" val="0"/>
+              </a:ext>
+            </a:extLst>
+          </a:blip>
+          <a:stretch>
+            <a:fillRect/>
+          </a:stretch>
+        </p:blipFill>
+        <p:spPr>
+          <a:xfrm>
+            <a:off x="1359189" y="1600200"/>
+            <a:ext cx="6425621" cy="4525963"/>
+          </a:xfrm>
+        </p:spPr>
+      </p:pic>
+    </p:spTree>
+    <p:extLst>
+      <p:ext uri="{BB962C8B-B14F-4D97-AF65-F5344CB8AC3E}">
+        <p14:creationId xmlns:p14="http://schemas.microsoft.com/office/powerpoint/2010/main" val="642465502"/>
       </p:ext>
     </p:extLst>
   </p:cSld>

</xml_diff>

<commit_message>
added rls alg to presentation
</commit_message>
<xml_diff>
--- a/documents/predPres.pptx
+++ b/documents/predPres.pptx
@@ -120,7 +120,7 @@
   </p:defaultTextStyle>
   <p:extLst>
     <p:ext uri="{EFAFB233-063F-42B5-8137-9DF3F51BA10A}">
-      <p15:sldGuideLst xmlns:p15="http://schemas.microsoft.com/office/powerpoint/2012/main" xmlns="">
+      <p15:sldGuideLst xmlns="" xmlns:p15="http://schemas.microsoft.com/office/powerpoint/2012/main">
         <p15:guide id="1" orient="horz" pos="2160">
           <p15:clr>
             <a:srgbClr val="A4A3A4"/>
@@ -219,7 +219,7 @@
           <a:p>
             <a:fld id="{EC457BD1-7C8B-6E43-BD70-1B4910981B79}" type="datetimeFigureOut">
               <a:rPr lang="en-US" smtClean="0"/>
-              <a:t>27/04/16</a:t>
+              <a:t>28/04/16</a:t>
             </a:fld>
             <a:endParaRPr lang="en-US"/>
           </a:p>
@@ -1369,7 +1369,7 @@
           <a:p>
             <a:fld id="{B58FBE55-019B-7F44-916F-F5D370B1C098}" type="datetimeFigureOut">
               <a:rPr lang="en-US" smtClean="0"/>
-              <a:t>27/04/16</a:t>
+              <a:t>28/04/16</a:t>
             </a:fld>
             <a:endParaRPr lang="en-US"/>
           </a:p>
@@ -1539,7 +1539,7 @@
           <a:p>
             <a:fld id="{B58FBE55-019B-7F44-916F-F5D370B1C098}" type="datetimeFigureOut">
               <a:rPr lang="en-US" smtClean="0"/>
-              <a:t>27/04/16</a:t>
+              <a:t>28/04/16</a:t>
             </a:fld>
             <a:endParaRPr lang="en-US"/>
           </a:p>
@@ -1719,7 +1719,7 @@
           <a:p>
             <a:fld id="{B58FBE55-019B-7F44-916F-F5D370B1C098}" type="datetimeFigureOut">
               <a:rPr lang="en-US" smtClean="0"/>
-              <a:t>27/04/16</a:t>
+              <a:t>28/04/16</a:t>
             </a:fld>
             <a:endParaRPr lang="en-US"/>
           </a:p>
@@ -1889,7 +1889,7 @@
           <a:p>
             <a:fld id="{B58FBE55-019B-7F44-916F-F5D370B1C098}" type="datetimeFigureOut">
               <a:rPr lang="en-US" smtClean="0"/>
-              <a:t>27/04/16</a:t>
+              <a:t>28/04/16</a:t>
             </a:fld>
             <a:endParaRPr lang="en-US"/>
           </a:p>
@@ -2135,7 +2135,7 @@
           <a:p>
             <a:fld id="{B58FBE55-019B-7F44-916F-F5D370B1C098}" type="datetimeFigureOut">
               <a:rPr lang="en-US" smtClean="0"/>
-              <a:t>27/04/16</a:t>
+              <a:t>28/04/16</a:t>
             </a:fld>
             <a:endParaRPr lang="en-US"/>
           </a:p>
@@ -2423,7 +2423,7 @@
           <a:p>
             <a:fld id="{B58FBE55-019B-7F44-916F-F5D370B1C098}" type="datetimeFigureOut">
               <a:rPr lang="en-US" smtClean="0"/>
-              <a:t>27/04/16</a:t>
+              <a:t>28/04/16</a:t>
             </a:fld>
             <a:endParaRPr lang="en-US"/>
           </a:p>
@@ -2845,7 +2845,7 @@
           <a:p>
             <a:fld id="{B58FBE55-019B-7F44-916F-F5D370B1C098}" type="datetimeFigureOut">
               <a:rPr lang="en-US" smtClean="0"/>
-              <a:t>27/04/16</a:t>
+              <a:t>28/04/16</a:t>
             </a:fld>
             <a:endParaRPr lang="en-US"/>
           </a:p>
@@ -2963,7 +2963,7 @@
           <a:p>
             <a:fld id="{B58FBE55-019B-7F44-916F-F5D370B1C098}" type="datetimeFigureOut">
               <a:rPr lang="en-US" smtClean="0"/>
-              <a:t>27/04/16</a:t>
+              <a:t>28/04/16</a:t>
             </a:fld>
             <a:endParaRPr lang="en-US"/>
           </a:p>
@@ -3058,7 +3058,7 @@
           <a:p>
             <a:fld id="{B58FBE55-019B-7F44-916F-F5D370B1C098}" type="datetimeFigureOut">
               <a:rPr lang="en-US" smtClean="0"/>
-              <a:t>27/04/16</a:t>
+              <a:t>28/04/16</a:t>
             </a:fld>
             <a:endParaRPr lang="en-US"/>
           </a:p>
@@ -3335,7 +3335,7 @@
           <a:p>
             <a:fld id="{B58FBE55-019B-7F44-916F-F5D370B1C098}" type="datetimeFigureOut">
               <a:rPr lang="en-US" smtClean="0"/>
-              <a:t>27/04/16</a:t>
+              <a:t>28/04/16</a:t>
             </a:fld>
             <a:endParaRPr lang="en-US"/>
           </a:p>
@@ -3588,7 +3588,7 @@
           <a:p>
             <a:fld id="{B58FBE55-019B-7F44-916F-F5D370B1C098}" type="datetimeFigureOut">
               <a:rPr lang="en-US" smtClean="0"/>
-              <a:t>27/04/16</a:t>
+              <a:t>28/04/16</a:t>
             </a:fld>
             <a:endParaRPr lang="en-US"/>
           </a:p>
@@ -3801,7 +3801,7 @@
           <a:p>
             <a:fld id="{B58FBE55-019B-7F44-916F-F5D370B1C098}" type="datetimeFigureOut">
               <a:rPr lang="en-US" smtClean="0"/>
-              <a:t>27/04/16</a:t>
+              <a:t>28/04/16</a:t>
             </a:fld>
             <a:endParaRPr lang="en-US"/>
           </a:p>
@@ -5216,8 +5216,38 @@
         </p:blipFill>
         <p:spPr>
           <a:xfrm>
-            <a:off x="3212203" y="2300669"/>
+            <a:off x="2611839" y="1654124"/>
             <a:ext cx="3750709" cy="906341"/>
+          </a:xfrm>
+          <a:prstGeom prst="rect">
+            <a:avLst/>
+          </a:prstGeom>
+        </p:spPr>
+      </p:pic>
+      <p:pic>
+        <p:nvPicPr>
+          <p:cNvPr id="5" name="Picture 4" descr="Screen Shot 2016-04-28 at 10.39.01.png"/>
+          <p:cNvPicPr>
+            <a:picLocks noChangeAspect="1"/>
+          </p:cNvPicPr>
+          <p:nvPr/>
+        </p:nvPicPr>
+        <p:blipFill>
+          <a:blip r:embed="rId3">
+            <a:extLst>
+              <a:ext uri="{28A0092B-C50C-407E-A947-70E740481C1C}">
+                <a14:useLocalDpi xmlns:a14="http://schemas.microsoft.com/office/drawing/2010/main" val="0"/>
+              </a:ext>
+            </a:extLst>
+          </a:blip>
+          <a:stretch>
+            <a:fillRect/>
+          </a:stretch>
+        </p:blipFill>
+        <p:spPr>
+          <a:xfrm>
+            <a:off x="935182" y="3437919"/>
+            <a:ext cx="7285182" cy="3296944"/>
           </a:xfrm>
           <a:prstGeom prst="rect">
             <a:avLst/>

</xml_diff>